<commit_message>
Yp changes to presentation
</commit_message>
<xml_diff>
--- a/Requirements/Presentations/GreenSheets OGA presentation.pptx
+++ b/Requirements/Presentations/GreenSheets OGA presentation.pptx
@@ -372,7 +372,7 @@
               <a:pPr>
                 <a:defRPr/>
               </a:pPr>
-              <a:t>6/6/2016</a:t>
+              <a:t>6/6/16</a:t>
             </a:fld>
             <a:endParaRPr lang="en-US" dirty="0"/>
           </a:p>
@@ -4408,7 +4408,7 @@
           <a:p>
             <a:fld id="{9E23832F-A033-A54E-AB4C-FBC3D83AD4AA}" type="datetimeFigureOut">
               <a:rPr lang="en-US" smtClean="0"/>
-              <a:t>6/6/2016</a:t>
+              <a:t>6/6/16</a:t>
             </a:fld>
             <a:endParaRPr lang="en-US"/>
           </a:p>
@@ -4578,7 +4578,7 @@
           <a:p>
             <a:fld id="{9E23832F-A033-A54E-AB4C-FBC3D83AD4AA}" type="datetimeFigureOut">
               <a:rPr lang="en-US" smtClean="0"/>
-              <a:t>6/6/2016</a:t>
+              <a:t>6/6/16</a:t>
             </a:fld>
             <a:endParaRPr lang="en-US"/>
           </a:p>
@@ -8551,7 +8551,7 @@
               </a14:hiddenLine>
             </a:ext>
             <a:ext uri="{FAA26D3D-D897-4be2-8F04-BA451C77F1D7}">
-              <ma14:placeholderFlag xmlns="" xmlns:ma14="http://schemas.microsoft.com/office/mac/drawingml/2011/main" val="1"/>
+              <ma14:placeholderFlag xmlns:ma14="http://schemas.microsoft.com/office/mac/drawingml/2011/main" val="1"/>
             </a:ext>
           </a:extLst>
         </p:spPr>
@@ -8614,7 +8614,7 @@
               </a14:hiddenLine>
             </a:ext>
             <a:ext uri="{FAA26D3D-D897-4be2-8F04-BA451C77F1D7}">
-              <ma14:placeholderFlag xmlns="" xmlns:ma14="http://schemas.microsoft.com/office/mac/drawingml/2011/main" val="1"/>
+              <ma14:placeholderFlag xmlns:ma14="http://schemas.microsoft.com/office/mac/drawingml/2011/main" val="1"/>
             </a:ext>
           </a:extLst>
         </p:spPr>
@@ -9557,7 +9557,7 @@
               </a14:hiddenLine>
             </a:ext>
             <a:ext uri="{FAA26D3D-D897-4be2-8F04-BA451C77F1D7}">
-              <ma14:placeholderFlag xmlns="" xmlns:ma14="http://schemas.microsoft.com/office/mac/drawingml/2011/main" val="1"/>
+              <ma14:placeholderFlag xmlns:ma14="http://schemas.microsoft.com/office/mac/drawingml/2011/main" val="1"/>
             </a:ext>
           </a:extLst>
         </p:spPr>
@@ -9767,28 +9767,28 @@
                 <a:gridCol w="381000">
                   <a:extLst>
                     <a:ext uri="{9D8B030D-6E8A-4147-A177-3AD203B41FA5}">
-                      <a16:colId xmlns:a16="http://schemas.microsoft.com/office/drawing/2014/main" val="3470465238"/>
+                      <a16:colId xmlns:a16="http://schemas.microsoft.com/office/drawing/2014/main" xmlns="" val="3470465238"/>
                     </a:ext>
                   </a:extLst>
                 </a:gridCol>
                 <a:gridCol w="1143000">
                   <a:extLst>
                     <a:ext uri="{9D8B030D-6E8A-4147-A177-3AD203B41FA5}">
-                      <a16:colId xmlns:a16="http://schemas.microsoft.com/office/drawing/2014/main" val="566013497"/>
+                      <a16:colId xmlns:a16="http://schemas.microsoft.com/office/drawing/2014/main" xmlns="" val="566013497"/>
                     </a:ext>
                   </a:extLst>
                 </a:gridCol>
                 <a:gridCol w="5562600">
                   <a:extLst>
                     <a:ext uri="{9D8B030D-6E8A-4147-A177-3AD203B41FA5}">
-                      <a16:colId xmlns:a16="http://schemas.microsoft.com/office/drawing/2014/main" val="1155483121"/>
+                      <a16:colId xmlns:a16="http://schemas.microsoft.com/office/drawing/2014/main" xmlns="" val="1155483121"/>
                     </a:ext>
                   </a:extLst>
                 </a:gridCol>
                 <a:gridCol w="810769">
                   <a:extLst>
                     <a:ext uri="{9D8B030D-6E8A-4147-A177-3AD203B41FA5}">
-                      <a16:colId xmlns:a16="http://schemas.microsoft.com/office/drawing/2014/main" val="4027703405"/>
+                      <a16:colId xmlns:a16="http://schemas.microsoft.com/office/drawing/2014/main" xmlns="" val="4027703405"/>
                     </a:ext>
                   </a:extLst>
                 </a:gridCol>
@@ -9859,7 +9859,7 @@
                 </a:tc>
                 <a:extLst>
                   <a:ext uri="{0D108BD9-81ED-4DB2-BD59-A6C34878D82A}">
-                    <a16:rowId xmlns:a16="http://schemas.microsoft.com/office/drawing/2014/main" val="2031018005"/>
+                    <a16:rowId xmlns:a16="http://schemas.microsoft.com/office/drawing/2014/main" xmlns="" val="2031018005"/>
                   </a:ext>
                 </a:extLst>
               </a:tr>
@@ -9893,19 +9893,7 @@
                         <a:rPr lang="en-US" sz="1200" kern="1200" dirty="0" smtClean="0">
                           <a:effectLst/>
                         </a:rPr>
-                        <a:t> </a:t>
-                      </a:r>
-                      <a:r>
-                        <a:rPr lang="en-US" sz="1200" kern="1200" dirty="0" smtClean="0">
-                          <a:effectLst/>
-                        </a:rPr>
-                        <a:t>Submission (Major </a:t>
-                      </a:r>
-                      <a:r>
-                        <a:rPr lang="en-US" sz="1200" kern="1200" dirty="0" smtClean="0">
-                          <a:effectLst/>
-                        </a:rPr>
-                        <a:t>reoccurring issue (PD </a:t>
+                        <a:t> Submission (Major reoccurring issue (PD </a:t>
                       </a:r>
                       <a:r>
                         <a:rPr lang="en-US" sz="1200" kern="1200" dirty="0" err="1" smtClean="0">
@@ -9980,7 +9968,7 @@
                 </a:tc>
                 <a:extLst>
                   <a:ext uri="{0D108BD9-81ED-4DB2-BD59-A6C34878D82A}">
-                    <a16:rowId xmlns:a16="http://schemas.microsoft.com/office/drawing/2014/main" val="495816025"/>
+                    <a16:rowId xmlns:a16="http://schemas.microsoft.com/office/drawing/2014/main" xmlns="" val="495816025"/>
                   </a:ext>
                 </a:extLst>
               </a:tr>
@@ -10212,7 +10200,7 @@
                 </a:tc>
                 <a:extLst>
                   <a:ext uri="{0D108BD9-81ED-4DB2-BD59-A6C34878D82A}">
-                    <a16:rowId xmlns:a16="http://schemas.microsoft.com/office/drawing/2014/main" val="794620933"/>
+                    <a16:rowId xmlns:a16="http://schemas.microsoft.com/office/drawing/2014/main" xmlns="" val="794620933"/>
                   </a:ext>
                 </a:extLst>
               </a:tr>
@@ -10312,7 +10300,7 @@
                 </a:tc>
                 <a:extLst>
                   <a:ext uri="{0D108BD9-81ED-4DB2-BD59-A6C34878D82A}">
-                    <a16:rowId xmlns:a16="http://schemas.microsoft.com/office/drawing/2014/main" val="1377526503"/>
+                    <a16:rowId xmlns:a16="http://schemas.microsoft.com/office/drawing/2014/main" xmlns="" val="1377526503"/>
                   </a:ext>
                 </a:extLst>
               </a:tr>
@@ -10478,7 +10466,7 @@
               </a14:hiddenLine>
             </a:ext>
             <a:ext uri="{FAA26D3D-D897-4be2-8F04-BA451C77F1D7}">
-              <ma14:placeholderFlag xmlns="" xmlns:ma14="http://schemas.microsoft.com/office/mac/drawingml/2011/main" val="1"/>
+              <ma14:placeholderFlag xmlns:ma14="http://schemas.microsoft.com/office/mac/drawingml/2011/main" val="1"/>
             </a:ext>
           </a:extLst>
         </p:spPr>
@@ -10688,28 +10676,28 @@
                 <a:gridCol w="388326">
                   <a:extLst>
                     <a:ext uri="{9D8B030D-6E8A-4147-A177-3AD203B41FA5}">
-                      <a16:colId xmlns:a16="http://schemas.microsoft.com/office/drawing/2014/main" val="3468351971"/>
+                      <a16:colId xmlns:a16="http://schemas.microsoft.com/office/drawing/2014/main" xmlns="" val="3468351971"/>
                     </a:ext>
                   </a:extLst>
                 </a:gridCol>
                 <a:gridCol w="1475642">
                   <a:extLst>
                     <a:ext uri="{9D8B030D-6E8A-4147-A177-3AD203B41FA5}">
-                      <a16:colId xmlns:a16="http://schemas.microsoft.com/office/drawing/2014/main" val="2942635306"/>
+                      <a16:colId xmlns:a16="http://schemas.microsoft.com/office/drawing/2014/main" xmlns="" val="2942635306"/>
                     </a:ext>
                   </a:extLst>
                 </a:gridCol>
                 <a:gridCol w="5358912">
                   <a:extLst>
                     <a:ext uri="{9D8B030D-6E8A-4147-A177-3AD203B41FA5}">
-                      <a16:colId xmlns:a16="http://schemas.microsoft.com/office/drawing/2014/main" val="603892619"/>
+                      <a16:colId xmlns:a16="http://schemas.microsoft.com/office/drawing/2014/main" xmlns="" val="603892619"/>
                     </a:ext>
                   </a:extLst>
                 </a:gridCol>
                 <a:gridCol w="854319">
                   <a:extLst>
                     <a:ext uri="{9D8B030D-6E8A-4147-A177-3AD203B41FA5}">
-                      <a16:colId xmlns:a16="http://schemas.microsoft.com/office/drawing/2014/main" val="3764083026"/>
+                      <a16:colId xmlns:a16="http://schemas.microsoft.com/office/drawing/2014/main" xmlns="" val="3764083026"/>
                     </a:ext>
                   </a:extLst>
                 </a:gridCol>
@@ -10780,7 +10768,7 @@
                 </a:tc>
                 <a:extLst>
                   <a:ext uri="{0D108BD9-81ED-4DB2-BD59-A6C34878D82A}">
-                    <a16:rowId xmlns:a16="http://schemas.microsoft.com/office/drawing/2014/main" val="2502539824"/>
+                    <a16:rowId xmlns:a16="http://schemas.microsoft.com/office/drawing/2014/main" xmlns="" val="2502539824"/>
                   </a:ext>
                 </a:extLst>
               </a:tr>
@@ -10952,7 +10940,7 @@
                 </a:tc>
                 <a:extLst>
                   <a:ext uri="{0D108BD9-81ED-4DB2-BD59-A6C34878D82A}">
-                    <a16:rowId xmlns:a16="http://schemas.microsoft.com/office/drawing/2014/main" val="1883649494"/>
+                    <a16:rowId xmlns:a16="http://schemas.microsoft.com/office/drawing/2014/main" xmlns="" val="1883649494"/>
                   </a:ext>
                 </a:extLst>
               </a:tr>
@@ -11104,7 +11092,7 @@
                 </a:tc>
                 <a:extLst>
                   <a:ext uri="{0D108BD9-81ED-4DB2-BD59-A6C34878D82A}">
-                    <a16:rowId xmlns:a16="http://schemas.microsoft.com/office/drawing/2014/main" val="1675105090"/>
+                    <a16:rowId xmlns:a16="http://schemas.microsoft.com/office/drawing/2014/main" xmlns="" val="1675105090"/>
                   </a:ext>
                 </a:extLst>
               </a:tr>
@@ -11220,7 +11208,7 @@
                 </a:tc>
                 <a:extLst>
                   <a:ext uri="{0D108BD9-81ED-4DB2-BD59-A6C34878D82A}">
-                    <a16:rowId xmlns:a16="http://schemas.microsoft.com/office/drawing/2014/main" val="1885641582"/>
+                    <a16:rowId xmlns:a16="http://schemas.microsoft.com/office/drawing/2014/main" xmlns="" val="1885641582"/>
                   </a:ext>
                 </a:extLst>
               </a:tr>
@@ -11300,7 +11288,7 @@
                 </a:tc>
                 <a:extLst>
                   <a:ext uri="{0D108BD9-81ED-4DB2-BD59-A6C34878D82A}">
-                    <a16:rowId xmlns:a16="http://schemas.microsoft.com/office/drawing/2014/main" val="1300638836"/>
+                    <a16:rowId xmlns:a16="http://schemas.microsoft.com/office/drawing/2014/main" xmlns="" val="1300638836"/>
                   </a:ext>
                 </a:extLst>
               </a:tr>
@@ -11391,14 +11379,14 @@
             <p:ph sz="quarter" idx="11"/>
             <p:extLst>
               <p:ext uri="{D42A27DB-BD31-4B8C-83A1-F6EECF244321}">
-                <p14:modId xmlns:p14="http://schemas.microsoft.com/office/powerpoint/2010/main" val="2244713273"/>
+                <p14:modId xmlns:p14="http://schemas.microsoft.com/office/powerpoint/2010/main" val="745087303"/>
               </p:ext>
             </p:extLst>
           </p:nvPr>
         </p:nvGraphicFramePr>
         <p:xfrm>
           <a:off x="481013" y="1066800"/>
-          <a:ext cx="8166100" cy="5003800"/>
+          <a:ext cx="8166100" cy="5369560"/>
         </p:xfrm>
         <a:graphic>
           <a:graphicData uri="http://schemas.openxmlformats.org/drawingml/2006/table">
@@ -11410,28 +11398,28 @@
                 <a:gridCol w="509587">
                   <a:extLst>
                     <a:ext uri="{9D8B030D-6E8A-4147-A177-3AD203B41FA5}">
-                      <a16:colId xmlns:a16="http://schemas.microsoft.com/office/drawing/2014/main" val="2625144938"/>
+                      <a16:colId xmlns:a16="http://schemas.microsoft.com/office/drawing/2014/main" xmlns="" val="2625144938"/>
                     </a:ext>
                   </a:extLst>
                 </a:gridCol>
                 <a:gridCol w="1600200">
                   <a:extLst>
                     <a:ext uri="{9D8B030D-6E8A-4147-A177-3AD203B41FA5}">
-                      <a16:colId xmlns:a16="http://schemas.microsoft.com/office/drawing/2014/main" val="3229782693"/>
+                      <a16:colId xmlns:a16="http://schemas.microsoft.com/office/drawing/2014/main" xmlns="" val="3229782693"/>
                     </a:ext>
                   </a:extLst>
                 </a:gridCol>
                 <a:gridCol w="5029200">
                   <a:extLst>
                     <a:ext uri="{9D8B030D-6E8A-4147-A177-3AD203B41FA5}">
-                      <a16:colId xmlns:a16="http://schemas.microsoft.com/office/drawing/2014/main" val="3904760336"/>
+                      <a16:colId xmlns:a16="http://schemas.microsoft.com/office/drawing/2014/main" xmlns="" val="3904760336"/>
                     </a:ext>
                   </a:extLst>
                 </a:gridCol>
                 <a:gridCol w="1027113">
                   <a:extLst>
                     <a:ext uri="{9D8B030D-6E8A-4147-A177-3AD203B41FA5}">
-                      <a16:colId xmlns:a16="http://schemas.microsoft.com/office/drawing/2014/main" val="774754358"/>
+                      <a16:colId xmlns:a16="http://schemas.microsoft.com/office/drawing/2014/main" xmlns="" val="774754358"/>
                     </a:ext>
                   </a:extLst>
                 </a:gridCol>
@@ -11502,7 +11490,7 @@
                 </a:tc>
                 <a:extLst>
                   <a:ext uri="{0D108BD9-81ED-4DB2-BD59-A6C34878D82A}">
-                    <a16:rowId xmlns:a16="http://schemas.microsoft.com/office/drawing/2014/main" val="1872534144"/>
+                    <a16:rowId xmlns:a16="http://schemas.microsoft.com/office/drawing/2014/main" xmlns="" val="1872534144"/>
                   </a:ext>
                 </a:extLst>
               </a:tr>
@@ -11608,31 +11596,7 @@
                           <a:ea typeface="+mn-ea"/>
                           <a:cs typeface="+mn-cs"/>
                         </a:rPr>
-                        <a:t> help system. From business case (September 2015</a:t>
-                      </a:r>
-                      <a:r>
-                        <a:rPr lang="en-US" sz="1000" kern="1200" baseline="0" dirty="0" smtClean="0">
-                          <a:solidFill>
-                            <a:schemeClr val="dk1"/>
-                          </a:solidFill>
-                          <a:effectLst/>
-                          <a:latin typeface="+mn-lt"/>
-                          <a:ea typeface="+mn-ea"/>
-                          <a:cs typeface="+mn-cs"/>
-                        </a:rPr>
-                        <a:t>): </a:t>
-                      </a:r>
-                      <a:r>
-                        <a:rPr lang="en-US" sz="1000" kern="1200" baseline="0" dirty="0" smtClean="0">
-                          <a:solidFill>
-                            <a:schemeClr val="dk1"/>
-                          </a:solidFill>
-                          <a:effectLst/>
-                          <a:latin typeface="+mn-lt"/>
-                          <a:ea typeface="+mn-ea"/>
-                          <a:cs typeface="+mn-cs"/>
-                        </a:rPr>
-                        <a:t>“The system, based on the responses, can display appropriate URLs that the user can click to get more information”. </a:t>
+                        <a:t> help system. From business case (September 2015): “The system, based on the responses, can display appropriate URLs that the user can click to get more information”. </a:t>
                       </a:r>
                     </a:p>
                     <a:p>
@@ -11902,7 +11866,7 @@
                 </a:tc>
                 <a:extLst>
                   <a:ext uri="{0D108BD9-81ED-4DB2-BD59-A6C34878D82A}">
-                    <a16:rowId xmlns:a16="http://schemas.microsoft.com/office/drawing/2014/main" val="2158343475"/>
+                    <a16:rowId xmlns:a16="http://schemas.microsoft.com/office/drawing/2014/main" xmlns="" val="2158343475"/>
                   </a:ext>
                 </a:extLst>
               </a:tr>
@@ -12463,7 +12427,7 @@
                 </a:tc>
                 <a:extLst>
                   <a:ext uri="{0D108BD9-81ED-4DB2-BD59-A6C34878D82A}">
-                    <a16:rowId xmlns:a16="http://schemas.microsoft.com/office/drawing/2014/main" val="237993953"/>
+                    <a16:rowId xmlns:a16="http://schemas.microsoft.com/office/drawing/2014/main" xmlns="" val="237993953"/>
                   </a:ext>
                 </a:extLst>
               </a:tr>
@@ -12534,35 +12498,137 @@
                     <a:bodyPr/>
                     <a:lstStyle/>
                     <a:p>
-                      <a:r>
-                        <a:rPr lang="en-US" dirty="0" smtClean="0">
+                      <a:pPr marL="171450" indent="-171450">
+                        <a:buFont typeface="Arial" charset="0"/>
+                        <a:buChar char="•"/>
+                      </a:pPr>
+                      <a:r>
+                        <a:rPr lang="en-US" sz="1000" kern="1200" dirty="0" smtClean="0">
                           <a:solidFill>
-                            <a:srgbClr val="FF0000"/>
+                            <a:schemeClr val="dk1"/>
                           </a:solidFill>
-                        </a:rPr>
-                        <a:t>Yakov, please add</a:t>
-                      </a:r>
-                      <a:r>
-                        <a:rPr lang="en-US" baseline="0" dirty="0" smtClean="0">
+                          <a:effectLst/>
+                          <a:latin typeface="+mn-lt"/>
+                          <a:ea typeface="+mn-ea"/>
+                          <a:cs typeface="+mn-cs"/>
+                          <a:sym typeface="Wingdings" panose="05000000000000000000" pitchFamily="2" charset="2"/>
+                        </a:rPr>
+                        <a:t>Tabular questions</a:t>
+                      </a:r>
+                    </a:p>
+                    <a:p>
+                      <a:pPr marL="171450" indent="-171450">
+                        <a:buFont typeface="Arial" charset="0"/>
+                        <a:buChar char="•"/>
+                      </a:pPr>
+                      <a:r>
+                        <a:rPr lang="en-US" sz="1000" kern="1200" dirty="0" smtClean="0">
                           <a:solidFill>
-                            <a:srgbClr val="FF0000"/>
+                            <a:schemeClr val="dk1"/>
                           </a:solidFill>
-                        </a:rPr>
-                        <a:t> </a:t>
-                      </a:r>
-                      <a:r>
-                        <a:rPr lang="en-US" baseline="0" dirty="0" smtClean="0">
+                          <a:effectLst/>
+                          <a:latin typeface="+mn-lt"/>
+                          <a:ea typeface="+mn-ea"/>
+                          <a:cs typeface="+mn-cs"/>
+                          <a:sym typeface="Wingdings" panose="05000000000000000000" pitchFamily="2" charset="2"/>
+                        </a:rPr>
+                        <a:t>Complex skip patterns (dependencies on multiple questions/answers</a:t>
+                      </a:r>
+                    </a:p>
+                    <a:p>
+                      <a:pPr marL="171450" indent="-171450">
+                        <a:buFont typeface="Arial" charset="0"/>
+                        <a:buChar char="•"/>
+                      </a:pPr>
+                      <a:r>
+                        <a:rPr lang="en-US" sz="1000" kern="1200" dirty="0" smtClean="0">
                           <a:solidFill>
-                            <a:srgbClr val="FF0000"/>
+                            <a:schemeClr val="dk1"/>
                           </a:solidFill>
+                          <a:effectLst/>
+                          <a:latin typeface="+mn-lt"/>
+                          <a:ea typeface="+mn-ea"/>
+                          <a:cs typeface="+mn-cs"/>
                           <a:sym typeface="Wingdings" panose="05000000000000000000" pitchFamily="2" charset="2"/>
                         </a:rPr>
-                        <a:t></a:t>
-                      </a:r>
-                      <a:endParaRPr lang="en-US" dirty="0">
+                        <a:t>Alternative</a:t>
+                      </a:r>
+                      <a:r>
+                        <a:rPr lang="en-US" sz="1000" kern="1200" baseline="0" dirty="0" smtClean="0">
+                          <a:solidFill>
+                            <a:schemeClr val="dk1"/>
+                          </a:solidFill>
+                          <a:effectLst/>
+                          <a:latin typeface="+mn-lt"/>
+                          <a:ea typeface="+mn-ea"/>
+                          <a:cs typeface="+mn-cs"/>
+                          <a:sym typeface="Wingdings" panose="05000000000000000000" pitchFamily="2" charset="2"/>
+                        </a:rPr>
+                        <a:t> question text</a:t>
+                      </a:r>
+                    </a:p>
+                    <a:p>
+                      <a:pPr marL="171450" indent="-171450">
+                        <a:buFont typeface="Arial" charset="0"/>
+                        <a:buChar char="•"/>
+                      </a:pPr>
+                      <a:r>
+                        <a:rPr lang="en-US" sz="1000" kern="1200" baseline="0" dirty="0" smtClean="0">
+                          <a:solidFill>
+                            <a:schemeClr val="dk1"/>
+                          </a:solidFill>
+                          <a:effectLst/>
+                          <a:latin typeface="+mn-lt"/>
+                          <a:ea typeface="+mn-ea"/>
+                          <a:cs typeface="+mn-cs"/>
+                          <a:sym typeface="Wingdings" panose="05000000000000000000" pitchFamily="2" charset="2"/>
+                        </a:rPr>
+                        <a:t>Enhanced question attributes (visibility, hidden, required, read only)</a:t>
+                      </a:r>
+                    </a:p>
+                    <a:p>
+                      <a:pPr marL="171450" indent="-171450">
+                        <a:buFont typeface="Arial" charset="0"/>
+                        <a:buChar char="•"/>
+                      </a:pPr>
+                      <a:r>
+                        <a:rPr lang="en-US" sz="1000" kern="1200" dirty="0" smtClean="0">
+                          <a:solidFill>
+                            <a:schemeClr val="dk1"/>
+                          </a:solidFill>
+                          <a:effectLst/>
+                          <a:latin typeface="+mn-lt"/>
+                          <a:ea typeface="+mn-ea"/>
+                          <a:cs typeface="+mn-cs"/>
+                        </a:rPr>
+                        <a:t>Question response values and labels</a:t>
+                      </a:r>
+                    </a:p>
+                    <a:p>
+                      <a:pPr marL="171450" indent="-171450">
+                        <a:buFont typeface="Arial" charset="0"/>
+                        <a:buChar char="•"/>
+                      </a:pPr>
+                      <a:r>
+                        <a:rPr lang="en-US" sz="1000" kern="1200" dirty="0" smtClean="0">
+                          <a:solidFill>
+                            <a:schemeClr val="dk1"/>
+                          </a:solidFill>
+                          <a:effectLst/>
+                          <a:latin typeface="+mn-lt"/>
+                          <a:ea typeface="+mn-ea"/>
+                          <a:cs typeface="+mn-cs"/>
+                        </a:rPr>
+                        <a:t>Complex forms (multi-instance, hierarchical forms)</a:t>
+                      </a:r>
+                      <a:endParaRPr lang="en-US" sz="1000" kern="1200" dirty="0">
                         <a:solidFill>
-                          <a:srgbClr val="FF0000"/>
+                          <a:schemeClr val="dk1"/>
                         </a:solidFill>
+                        <a:effectLst/>
+                        <a:latin typeface="+mn-lt"/>
+                        <a:ea typeface="+mn-ea"/>
+                        <a:cs typeface="+mn-cs"/>
                       </a:endParaRPr>
                     </a:p>
                   </a:txBody>
@@ -12580,7 +12646,7 @@
                 </a:tc>
                 <a:extLst>
                   <a:ext uri="{0D108BD9-81ED-4DB2-BD59-A6C34878D82A}">
-                    <a16:rowId xmlns:a16="http://schemas.microsoft.com/office/drawing/2014/main" val="384396010"/>
+                    <a16:rowId xmlns:a16="http://schemas.microsoft.com/office/drawing/2014/main" xmlns="" val="384396010"/>
                   </a:ext>
                 </a:extLst>
               </a:tr>
@@ -12683,7 +12749,7 @@
             <p:ph sz="quarter" idx="11"/>
             <p:extLst>
               <p:ext uri="{D42A27DB-BD31-4B8C-83A1-F6EECF244321}">
-                <p14:modId xmlns:p14="http://schemas.microsoft.com/office/powerpoint/2010/main" val="2600928600"/>
+                <p14:modId xmlns:p14="http://schemas.microsoft.com/office/powerpoint/2010/main" val="1544898562"/>
               </p:ext>
             </p:extLst>
           </p:nvPr>
@@ -12702,28 +12768,28 @@
                 <a:gridCol w="311260">
                   <a:extLst>
                     <a:ext uri="{9D8B030D-6E8A-4147-A177-3AD203B41FA5}">
-                      <a16:colId xmlns:a16="http://schemas.microsoft.com/office/drawing/2014/main" val="380828174"/>
+                      <a16:colId xmlns:a16="http://schemas.microsoft.com/office/drawing/2014/main" xmlns="" val="380828174"/>
                     </a:ext>
                   </a:extLst>
                 </a:gridCol>
                 <a:gridCol w="1212740">
                   <a:extLst>
                     <a:ext uri="{9D8B030D-6E8A-4147-A177-3AD203B41FA5}">
-                      <a16:colId xmlns:a16="http://schemas.microsoft.com/office/drawing/2014/main" val="1351816480"/>
+                      <a16:colId xmlns:a16="http://schemas.microsoft.com/office/drawing/2014/main" xmlns="" val="1351816480"/>
                     </a:ext>
                   </a:extLst>
                 </a:gridCol>
                 <a:gridCol w="2362200">
                   <a:extLst>
                     <a:ext uri="{9D8B030D-6E8A-4147-A177-3AD203B41FA5}">
-                      <a16:colId xmlns:a16="http://schemas.microsoft.com/office/drawing/2014/main" val="287736014"/>
+                      <a16:colId xmlns:a16="http://schemas.microsoft.com/office/drawing/2014/main" xmlns="" val="287736014"/>
                     </a:ext>
                   </a:extLst>
                 </a:gridCol>
                 <a:gridCol w="4190999">
                   <a:extLst>
                     <a:ext uri="{9D8B030D-6E8A-4147-A177-3AD203B41FA5}">
-                      <a16:colId xmlns:a16="http://schemas.microsoft.com/office/drawing/2014/main" val="2028519938"/>
+                      <a16:colId xmlns:a16="http://schemas.microsoft.com/office/drawing/2014/main" xmlns="" val="2028519938"/>
                     </a:ext>
                   </a:extLst>
                 </a:gridCol>
@@ -12787,7 +12853,7 @@
                 </a:tc>
                 <a:extLst>
                   <a:ext uri="{0D108BD9-81ED-4DB2-BD59-A6C34878D82A}">
-                    <a16:rowId xmlns:a16="http://schemas.microsoft.com/office/drawing/2014/main" val="1140275068"/>
+                    <a16:rowId xmlns:a16="http://schemas.microsoft.com/office/drawing/2014/main" xmlns="" val="1140275068"/>
                   </a:ext>
                 </a:extLst>
               </a:tr>
@@ -12855,26 +12921,92 @@
                           <a:ea typeface="+mn-ea"/>
                           <a:cs typeface="+mn-cs"/>
                         </a:rPr>
-                        <a:t>Database migration</a:t>
-                      </a:r>
+                        <a:t>Database </a:t>
+                      </a:r>
+                      <a:r>
+                        <a:rPr lang="en-US" sz="1000" kern="1200" dirty="0" smtClean="0">
+                          <a:solidFill>
+                            <a:schemeClr val="dk1"/>
+                          </a:solidFill>
+                          <a:latin typeface="+mn-lt"/>
+                          <a:ea typeface="+mn-ea"/>
+                          <a:cs typeface="+mn-cs"/>
+                        </a:rPr>
+                        <a:t>migration</a:t>
+                      </a:r>
+                    </a:p>
+                    <a:p>
+                      <a:pPr marL="171450" indent="-171450">
+                        <a:buFont typeface="Arial" panose="020B0604020202020204" pitchFamily="34" charset="0"/>
+                        <a:buChar char="•"/>
+                      </a:pPr>
+                      <a:r>
+                        <a:rPr lang="en-US" sz="1000" kern="1200" dirty="0" smtClean="0">
+                          <a:solidFill>
+                            <a:schemeClr val="dk1"/>
+                          </a:solidFill>
+                          <a:latin typeface="+mn-lt"/>
+                          <a:ea typeface="+mn-ea"/>
+                          <a:cs typeface="+mn-cs"/>
+                        </a:rPr>
+                        <a:t>Hibernate transactional framework</a:t>
+                      </a:r>
+                    </a:p>
+                    <a:p>
+                      <a:pPr marL="171450" indent="-171450">
+                        <a:buFont typeface="Arial" panose="020B0604020202020204" pitchFamily="34" charset="0"/>
+                        <a:buChar char="•"/>
+                      </a:pPr>
+                      <a:r>
+                        <a:rPr lang="en-US" sz="1000" kern="1200" dirty="0" smtClean="0">
+                          <a:solidFill>
+                            <a:schemeClr val="dk1"/>
+                          </a:solidFill>
+                          <a:latin typeface="+mn-lt"/>
+                          <a:ea typeface="+mn-ea"/>
+                          <a:cs typeface="+mn-cs"/>
+                        </a:rPr>
+                        <a:t>Struts 2 MVC framework</a:t>
+                      </a:r>
+                    </a:p>
+                    <a:p>
+                      <a:pPr marL="171450" indent="-171450">
+                        <a:buFont typeface="Arial" panose="020B0604020202020204" pitchFamily="34" charset="0"/>
+                        <a:buChar char="•"/>
+                      </a:pPr>
+                      <a:r>
+                        <a:rPr lang="en-US" sz="1000" kern="1200" dirty="0" smtClean="0">
+                          <a:solidFill>
+                            <a:schemeClr val="dk1"/>
+                          </a:solidFill>
+                          <a:latin typeface="+mn-lt"/>
+                          <a:ea typeface="+mn-ea"/>
+                          <a:cs typeface="+mn-cs"/>
+                        </a:rPr>
+                        <a:t>Modern front-end</a:t>
+                      </a:r>
+                      <a:r>
+                        <a:rPr lang="en-US" sz="1000" kern="1200" baseline="0" dirty="0" smtClean="0">
+                          <a:solidFill>
+                            <a:schemeClr val="dk1"/>
+                          </a:solidFill>
+                          <a:latin typeface="+mn-lt"/>
+                          <a:ea typeface="+mn-ea"/>
+                          <a:cs typeface="+mn-cs"/>
+                        </a:rPr>
+                        <a:t> frameworks like Bootstrap, JQuery, CSS, etc.</a:t>
+                      </a:r>
+                      <a:endParaRPr lang="en-US" sz="1000" kern="1200" dirty="0" smtClean="0">
+                        <a:solidFill>
+                          <a:schemeClr val="dk1"/>
+                        </a:solidFill>
+                        <a:latin typeface="+mn-lt"/>
+                        <a:ea typeface="+mn-ea"/>
+                        <a:cs typeface="+mn-cs"/>
+                      </a:endParaRPr>
                     </a:p>
                     <a:p>
                       <a:endParaRPr lang="en-US" sz="1000" dirty="0" smtClean="0">
-                        <a:solidFill>
-                          <a:srgbClr val="FF0000"/>
-                        </a:solidFill>
-                      </a:endParaRPr>
-                    </a:p>
-                    <a:p>
-                      <a:r>
-                        <a:rPr lang="en-US" sz="1000" dirty="0" smtClean="0">
-                          <a:solidFill>
-                            <a:srgbClr val="FF0000"/>
-                          </a:solidFill>
-                        </a:rPr>
-                        <a:t>Yakov, please add</a:t>
-                      </a:r>
-                      <a:endParaRPr lang="en-US" sz="1000" dirty="0">
                         <a:solidFill>
                           <a:srgbClr val="FF0000"/>
                         </a:solidFill>
@@ -13019,7 +13151,7 @@
                 </a:tc>
                 <a:extLst>
                   <a:ext uri="{0D108BD9-81ED-4DB2-BD59-A6C34878D82A}">
-                    <a16:rowId xmlns:a16="http://schemas.microsoft.com/office/drawing/2014/main" val="241101412"/>
+                    <a16:rowId xmlns:a16="http://schemas.microsoft.com/office/drawing/2014/main" xmlns="" val="241101412"/>
                   </a:ext>
                 </a:extLst>
               </a:tr>
@@ -13117,7 +13249,7 @@
                 </a:tc>
                 <a:extLst>
                   <a:ext uri="{0D108BD9-81ED-4DB2-BD59-A6C34878D82A}">
-                    <a16:rowId xmlns:a16="http://schemas.microsoft.com/office/drawing/2014/main" val="968029505"/>
+                    <a16:rowId xmlns:a16="http://schemas.microsoft.com/office/drawing/2014/main" xmlns="" val="968029505"/>
                   </a:ext>
                 </a:extLst>
               </a:tr>
@@ -13282,7 +13414,7 @@
                 </a:tc>
                 <a:extLst>
                   <a:ext uri="{0D108BD9-81ED-4DB2-BD59-A6C34878D82A}">
-                    <a16:rowId xmlns:a16="http://schemas.microsoft.com/office/drawing/2014/main" val="3148058054"/>
+                    <a16:rowId xmlns:a16="http://schemas.microsoft.com/office/drawing/2014/main" xmlns="" val="3148058054"/>
                   </a:ext>
                 </a:extLst>
               </a:tr>
@@ -13399,28 +13531,28 @@
                 <a:gridCol w="280987">
                   <a:extLst>
                     <a:ext uri="{9D8B030D-6E8A-4147-A177-3AD203B41FA5}">
-                      <a16:colId xmlns:a16="http://schemas.microsoft.com/office/drawing/2014/main" val="1954285698"/>
+                      <a16:colId xmlns:a16="http://schemas.microsoft.com/office/drawing/2014/main" xmlns="" val="1954285698"/>
                     </a:ext>
                   </a:extLst>
                 </a:gridCol>
                 <a:gridCol w="1600200">
                   <a:extLst>
                     <a:ext uri="{9D8B030D-6E8A-4147-A177-3AD203B41FA5}">
-                      <a16:colId xmlns:a16="http://schemas.microsoft.com/office/drawing/2014/main" val="660327392"/>
+                      <a16:colId xmlns:a16="http://schemas.microsoft.com/office/drawing/2014/main" xmlns="" val="660327392"/>
                     </a:ext>
                   </a:extLst>
                 </a:gridCol>
                 <a:gridCol w="4243388">
                   <a:extLst>
                     <a:ext uri="{9D8B030D-6E8A-4147-A177-3AD203B41FA5}">
-                      <a16:colId xmlns:a16="http://schemas.microsoft.com/office/drawing/2014/main" val="565316900"/>
+                      <a16:colId xmlns:a16="http://schemas.microsoft.com/office/drawing/2014/main" xmlns="" val="565316900"/>
                     </a:ext>
                   </a:extLst>
                 </a:gridCol>
                 <a:gridCol w="2041525">
                   <a:extLst>
                     <a:ext uri="{9D8B030D-6E8A-4147-A177-3AD203B41FA5}">
-                      <a16:colId xmlns:a16="http://schemas.microsoft.com/office/drawing/2014/main" val="14894145"/>
+                      <a16:colId xmlns:a16="http://schemas.microsoft.com/office/drawing/2014/main" xmlns="" val="14894145"/>
                     </a:ext>
                   </a:extLst>
                 </a:gridCol>
@@ -13484,7 +13616,7 @@
                 </a:tc>
                 <a:extLst>
                   <a:ext uri="{0D108BD9-81ED-4DB2-BD59-A6C34878D82A}">
-                    <a16:rowId xmlns:a16="http://schemas.microsoft.com/office/drawing/2014/main" val="3523852803"/>
+                    <a16:rowId xmlns:a16="http://schemas.microsoft.com/office/drawing/2014/main" xmlns="" val="3523852803"/>
                   </a:ext>
                 </a:extLst>
               </a:tr>
@@ -13717,21 +13849,13 @@
                         </a:rPr>
                         <a:t>Address business case needs and existing issues</a:t>
                       </a:r>
-                      <a:endParaRPr lang="en-US" sz="1000" kern="1200" dirty="0" smtClean="0">
-                        <a:solidFill>
-                          <a:schemeClr val="dk1"/>
-                        </a:solidFill>
-                        <a:latin typeface="+mn-lt"/>
-                        <a:ea typeface="+mn-ea"/>
-                        <a:cs typeface="+mn-cs"/>
-                      </a:endParaRPr>
                     </a:p>
                   </a:txBody>
                   <a:tcPr/>
                 </a:tc>
                 <a:extLst>
                   <a:ext uri="{0D108BD9-81ED-4DB2-BD59-A6C34878D82A}">
-                    <a16:rowId xmlns:a16="http://schemas.microsoft.com/office/drawing/2014/main" val="1239387137"/>
+                    <a16:rowId xmlns:a16="http://schemas.microsoft.com/office/drawing/2014/main" xmlns="" val="1239387137"/>
                   </a:ext>
                 </a:extLst>
               </a:tr>
@@ -13945,18 +14069,7 @@
                           <a:ea typeface="+mn-ea"/>
                           <a:cs typeface="+mn-cs"/>
                         </a:rPr>
-                        <a:t>User - super user role has been created in the past for troubleshooting purposes. Need to find a way to perform troubleshooting in PRODUCTION without actually assuming the user’s identity</a:t>
-                      </a:r>
-                      <a:r>
-                        <a:rPr lang="en-US" sz="1000" kern="1200" dirty="0" smtClean="0">
-                          <a:solidFill>
-                            <a:schemeClr val="dk1"/>
-                          </a:solidFill>
-                          <a:latin typeface="+mn-lt"/>
-                          <a:ea typeface="+mn-ea"/>
-                          <a:cs typeface="+mn-cs"/>
-                        </a:rPr>
-                        <a:t>.</a:t>
+                        <a:t>User - super user role has been created in the past for troubleshooting purposes. Need to find a way to perform troubleshooting in PRODUCTION without actually assuming the user’s identity.</a:t>
                       </a:r>
                     </a:p>
                     <a:p>
@@ -14100,7 +14213,7 @@
                 </a:tc>
                 <a:extLst>
                   <a:ext uri="{0D108BD9-81ED-4DB2-BD59-A6C34878D82A}">
-                    <a16:rowId xmlns:a16="http://schemas.microsoft.com/office/drawing/2014/main" val="375070687"/>
+                    <a16:rowId xmlns:a16="http://schemas.microsoft.com/office/drawing/2014/main" xmlns="" val="375070687"/>
                   </a:ext>
                 </a:extLst>
               </a:tr>
@@ -14185,7 +14298,7 @@
                 </a:tc>
                 <a:extLst>
                   <a:ext uri="{0D108BD9-81ED-4DB2-BD59-A6C34878D82A}">
-                    <a16:rowId xmlns:a16="http://schemas.microsoft.com/office/drawing/2014/main" val="3070395"/>
+                    <a16:rowId xmlns:a16="http://schemas.microsoft.com/office/drawing/2014/main" xmlns="" val="3070395"/>
                   </a:ext>
                 </a:extLst>
               </a:tr>
@@ -14734,21 +14847,21 @@
                 <a:gridCol w="2681542">
                   <a:extLst>
                     <a:ext uri="{9D8B030D-6E8A-4147-A177-3AD203B41FA5}">
-                      <a16:colId xmlns:a16="http://schemas.microsoft.com/office/drawing/2014/main" val="20000"/>
+                      <a16:colId xmlns:a16="http://schemas.microsoft.com/office/drawing/2014/main" xmlns="" val="20000"/>
                     </a:ext>
                   </a:extLst>
                 </a:gridCol>
                 <a:gridCol w="2032000">
                   <a:extLst>
                     <a:ext uri="{9D8B030D-6E8A-4147-A177-3AD203B41FA5}">
-                      <a16:colId xmlns:a16="http://schemas.microsoft.com/office/drawing/2014/main" val="20001"/>
+                      <a16:colId xmlns:a16="http://schemas.microsoft.com/office/drawing/2014/main" xmlns="" val="20001"/>
                     </a:ext>
                   </a:extLst>
                 </a:gridCol>
                 <a:gridCol w="2032000">
                   <a:extLst>
                     <a:ext uri="{9D8B030D-6E8A-4147-A177-3AD203B41FA5}">
-                      <a16:colId xmlns:a16="http://schemas.microsoft.com/office/drawing/2014/main" val="20002"/>
+                      <a16:colId xmlns:a16="http://schemas.microsoft.com/office/drawing/2014/main" xmlns="" val="20002"/>
                     </a:ext>
                   </a:extLst>
                 </a:gridCol>
@@ -14817,7 +14930,7 @@
                 </a:tc>
                 <a:extLst>
                   <a:ext uri="{0D108BD9-81ED-4DB2-BD59-A6C34878D82A}">
-                    <a16:rowId xmlns:a16="http://schemas.microsoft.com/office/drawing/2014/main" val="10000"/>
+                    <a16:rowId xmlns:a16="http://schemas.microsoft.com/office/drawing/2014/main" xmlns="" val="10000"/>
                   </a:ext>
                 </a:extLst>
               </a:tr>
@@ -15918,19 +16031,7 @@
                   </a:outerShdw>
                 </a:effectLst>
               </a:rPr>
-              <a:t>user </a:t>
-            </a:r>
-            <a:r>
-              <a:rPr lang="en-US" b="1" dirty="0" smtClean="0">
-                <a:effectLst>
-                  <a:outerShdw blurRad="38100" dist="38100" dir="2700000" algn="tl">
-                    <a:srgbClr val="000000">
-                      <a:alpha val="43137"/>
-                    </a:srgbClr>
-                  </a:outerShdw>
-                </a:effectLst>
-              </a:rPr>
-              <a:t>functionality</a:t>
+              <a:t>user functionality</a:t>
             </a:r>
             <a:endParaRPr lang="en-US" dirty="0"/>
           </a:p>
@@ -15965,14 +16066,14 @@
                 <a:gridCol w="890587">
                   <a:extLst>
                     <a:ext uri="{9D8B030D-6E8A-4147-A177-3AD203B41FA5}">
-                      <a16:colId xmlns:a16="http://schemas.microsoft.com/office/drawing/2014/main" val="1095705614"/>
+                      <a16:colId xmlns:a16="http://schemas.microsoft.com/office/drawing/2014/main" xmlns="" val="1095705614"/>
                     </a:ext>
                   </a:extLst>
                 </a:gridCol>
                 <a:gridCol w="7275513">
                   <a:extLst>
                     <a:ext uri="{9D8B030D-6E8A-4147-A177-3AD203B41FA5}">
-                      <a16:colId xmlns:a16="http://schemas.microsoft.com/office/drawing/2014/main" val="348828888"/>
+                      <a16:colId xmlns:a16="http://schemas.microsoft.com/office/drawing/2014/main" xmlns="" val="348828888"/>
                     </a:ext>
                   </a:extLst>
                 </a:gridCol>
@@ -16008,7 +16109,7 @@
                 </a:tc>
                 <a:extLst>
                   <a:ext uri="{0D108BD9-81ED-4DB2-BD59-A6C34878D82A}">
-                    <a16:rowId xmlns:a16="http://schemas.microsoft.com/office/drawing/2014/main" val="3292372988"/>
+                    <a16:rowId xmlns:a16="http://schemas.microsoft.com/office/drawing/2014/main" xmlns="" val="3292372988"/>
                   </a:ext>
                 </a:extLst>
               </a:tr>
@@ -16755,7 +16856,7 @@
                 </a:tc>
                 <a:extLst>
                   <a:ext uri="{0D108BD9-81ED-4DB2-BD59-A6C34878D82A}">
-                    <a16:rowId xmlns:a16="http://schemas.microsoft.com/office/drawing/2014/main" val="216689262"/>
+                    <a16:rowId xmlns:a16="http://schemas.microsoft.com/office/drawing/2014/main" xmlns="" val="216689262"/>
                   </a:ext>
                 </a:extLst>
               </a:tr>
@@ -16836,7 +16937,7 @@
                 </a:tc>
                 <a:extLst>
                   <a:ext uri="{0D108BD9-81ED-4DB2-BD59-A6C34878D82A}">
-                    <a16:rowId xmlns:a16="http://schemas.microsoft.com/office/drawing/2014/main" val="2813983195"/>
+                    <a16:rowId xmlns:a16="http://schemas.microsoft.com/office/drawing/2014/main" xmlns="" val="2813983195"/>
                   </a:ext>
                 </a:extLst>
               </a:tr>
@@ -16902,14 +17003,14 @@
                 <a:gridCol w="1162999">
                   <a:extLst>
                     <a:ext uri="{9D8B030D-6E8A-4147-A177-3AD203B41FA5}">
-                      <a16:colId xmlns:a16="http://schemas.microsoft.com/office/drawing/2014/main" val="2013491450"/>
+                      <a16:colId xmlns:a16="http://schemas.microsoft.com/office/drawing/2014/main" xmlns="" val="2013491450"/>
                     </a:ext>
                   </a:extLst>
                 </a:gridCol>
                 <a:gridCol w="3870403">
                   <a:extLst>
                     <a:ext uri="{9D8B030D-6E8A-4147-A177-3AD203B41FA5}">
-                      <a16:colId xmlns:a16="http://schemas.microsoft.com/office/drawing/2014/main" val="860990487"/>
+                      <a16:colId xmlns:a16="http://schemas.microsoft.com/office/drawing/2014/main" xmlns="" val="860990487"/>
                     </a:ext>
                   </a:extLst>
                 </a:gridCol>
@@ -16945,7 +17046,7 @@
                 </a:tc>
                 <a:extLst>
                   <a:ext uri="{0D108BD9-81ED-4DB2-BD59-A6C34878D82A}">
-                    <a16:rowId xmlns:a16="http://schemas.microsoft.com/office/drawing/2014/main" val="3398604234"/>
+                    <a16:rowId xmlns:a16="http://schemas.microsoft.com/office/drawing/2014/main" xmlns="" val="3398604234"/>
                   </a:ext>
                 </a:extLst>
               </a:tr>
@@ -16984,7 +17085,7 @@
                 </a:tc>
                 <a:extLst>
                   <a:ext uri="{0D108BD9-81ED-4DB2-BD59-A6C34878D82A}">
-                    <a16:rowId xmlns:a16="http://schemas.microsoft.com/office/drawing/2014/main" val="3455845262"/>
+                    <a16:rowId xmlns:a16="http://schemas.microsoft.com/office/drawing/2014/main" xmlns="" val="3455845262"/>
                   </a:ext>
                 </a:extLst>
               </a:tr>
@@ -17077,7 +17178,7 @@
                 </a:tc>
                 <a:extLst>
                   <a:ext uri="{0D108BD9-81ED-4DB2-BD59-A6C34878D82A}">
-                    <a16:rowId xmlns:a16="http://schemas.microsoft.com/office/drawing/2014/main" val="2853560189"/>
+                    <a16:rowId xmlns:a16="http://schemas.microsoft.com/office/drawing/2014/main" xmlns="" val="2853560189"/>
                   </a:ext>
                 </a:extLst>
               </a:tr>
@@ -17125,7 +17226,7 @@
                 </a:tc>
                 <a:extLst>
                   <a:ext uri="{0D108BD9-81ED-4DB2-BD59-A6C34878D82A}">
-                    <a16:rowId xmlns:a16="http://schemas.microsoft.com/office/drawing/2014/main" val="362370941"/>
+                    <a16:rowId xmlns:a16="http://schemas.microsoft.com/office/drawing/2014/main" xmlns="" val="362370941"/>
                   </a:ext>
                 </a:extLst>
               </a:tr>
@@ -17188,7 +17289,7 @@
                 </a:tc>
                 <a:extLst>
                   <a:ext uri="{0D108BD9-81ED-4DB2-BD59-A6C34878D82A}">
-                    <a16:rowId xmlns:a16="http://schemas.microsoft.com/office/drawing/2014/main" val="3127199585"/>
+                    <a16:rowId xmlns:a16="http://schemas.microsoft.com/office/drawing/2014/main" xmlns="" val="3127199585"/>
                   </a:ext>
                 </a:extLst>
               </a:tr>
@@ -17286,7 +17387,7 @@
                 </a:tc>
                 <a:extLst>
                   <a:ext uri="{0D108BD9-81ED-4DB2-BD59-A6C34878D82A}">
-                    <a16:rowId xmlns:a16="http://schemas.microsoft.com/office/drawing/2014/main" val="3423163059"/>
+                    <a16:rowId xmlns:a16="http://schemas.microsoft.com/office/drawing/2014/main" xmlns="" val="3423163059"/>
                   </a:ext>
                 </a:extLst>
               </a:tr>
@@ -17471,7 +17572,7 @@
           <a:graphicData uri="http://schemas.openxmlformats.org/presentationml/2006/ole">
             <mc:AlternateContent xmlns:mc="http://schemas.openxmlformats.org/markup-compatibility/2006">
               <mc:Choice xmlns:v="urn:schemas-microsoft-com:vml" Requires="v">
-                <p:oleObj spid="_x0000_s1507" name="Visio" r:id="rId4" imgW="6165082" imgH="2853576" progId="Visio.Drawing.11">
+                <p:oleObj spid="_x0000_s1524" name="Visio" r:id="rId4" imgW="6165082" imgH="2853576" progId="Visio.Drawing.11">
                   <p:embed/>
                 </p:oleObj>
               </mc:Choice>
@@ -17601,7 +17702,7 @@
           <a:graphicData uri="http://schemas.openxmlformats.org/presentationml/2006/ole">
             <mc:AlternateContent xmlns:mc="http://schemas.openxmlformats.org/markup-compatibility/2006">
               <mc:Choice xmlns:v="urn:schemas-microsoft-com:vml" Requires="v">
-                <p:oleObj spid="_x0000_s1508" name="Visio" r:id="rId6" imgW="3196429" imgH="2853576" progId="Visio.Drawing.11">
+                <p:oleObj spid="_x0000_s1525" name="Visio" r:id="rId6" imgW="3196429" imgH="2853576" progId="Visio.Drawing.11">
                   <p:embed/>
                 </p:oleObj>
               </mc:Choice>
@@ -17794,7 +17895,7 @@
           <a:graphicData uri="http://schemas.openxmlformats.org/presentationml/2006/ole">
             <mc:AlternateContent xmlns:mc="http://schemas.openxmlformats.org/markup-compatibility/2006">
               <mc:Choice xmlns:v="urn:schemas-microsoft-com:vml" Requires="v">
-                <p:oleObj spid="_x0000_s1509" name="Visio" r:id="rId8" imgW="3196429" imgH="1796256" progId="Visio.Drawing.11">
+                <p:oleObj spid="_x0000_s1526" name="Visio" r:id="rId8" imgW="3196429" imgH="1796256" progId="Visio.Drawing.11">
                   <p:embed/>
                 </p:oleObj>
               </mc:Choice>
@@ -17924,7 +18025,7 @@
           <a:graphicData uri="http://schemas.openxmlformats.org/presentationml/2006/ole">
             <mc:AlternateContent xmlns:mc="http://schemas.openxmlformats.org/markup-compatibility/2006">
               <mc:Choice xmlns:v="urn:schemas-microsoft-com:vml" Requires="v">
-                <p:oleObj spid="_x0000_s1510" name="Visio" r:id="rId10" imgW="243768" imgH="605880" progId="Visio.Drawing.11">
+                <p:oleObj spid="_x0000_s1527" name="Visio" r:id="rId10" imgW="243768" imgH="605880" progId="Visio.Drawing.11">
                   <p:embed/>
                 </p:oleObj>
               </mc:Choice>
@@ -18063,7 +18164,7 @@
           <a:graphicData uri="http://schemas.openxmlformats.org/presentationml/2006/ole">
             <mc:AlternateContent xmlns:mc="http://schemas.openxmlformats.org/markup-compatibility/2006">
               <mc:Choice xmlns:v="urn:schemas-microsoft-com:vml" Requires="v">
-                <p:oleObj spid="_x0000_s1511" name="Visio" r:id="rId12" imgW="1091337" imgH="605880" progId="Visio.Drawing.11">
+                <p:oleObj spid="_x0000_s1528" name="Visio" r:id="rId12" imgW="1091337" imgH="605880" progId="Visio.Drawing.11">
                   <p:embed/>
                 </p:oleObj>
               </mc:Choice>
@@ -18202,7 +18303,7 @@
           <a:graphicData uri="http://schemas.openxmlformats.org/presentationml/2006/ole">
             <mc:AlternateContent xmlns:mc="http://schemas.openxmlformats.org/markup-compatibility/2006">
               <mc:Choice xmlns:v="urn:schemas-microsoft-com:vml" Requires="v">
-                <p:oleObj spid="_x0000_s1512" name="Visio" r:id="rId14" imgW="751402" imgH="605880" progId="Visio.Drawing.11">
+                <p:oleObj spid="_x0000_s1529" name="Visio" r:id="rId14" imgW="751402" imgH="605880" progId="Visio.Drawing.11">
                   <p:embed/>
                 </p:oleObj>
               </mc:Choice>
@@ -18332,7 +18433,7 @@
           <a:graphicData uri="http://schemas.openxmlformats.org/presentationml/2006/ole">
             <mc:AlternateContent xmlns:mc="http://schemas.openxmlformats.org/markup-compatibility/2006">
               <mc:Choice xmlns:v="urn:schemas-microsoft-com:vml" Requires="v">
-                <p:oleObj spid="_x0000_s1513" name="Visio" r:id="rId16" imgW="267540" imgH="605880" progId="Visio.Drawing.11">
+                <p:oleObj spid="_x0000_s1530" name="Visio" r:id="rId16" imgW="267540" imgH="605880" progId="Visio.Drawing.11">
                   <p:embed/>
                 </p:oleObj>
               </mc:Choice>
@@ -18471,7 +18572,7 @@
           <a:graphicData uri="http://schemas.openxmlformats.org/presentationml/2006/ole">
             <mc:AlternateContent xmlns:mc="http://schemas.openxmlformats.org/markup-compatibility/2006">
               <mc:Choice xmlns:v="urn:schemas-microsoft-com:vml" Requires="v">
-                <p:oleObj spid="_x0000_s1514" name="Visio" r:id="rId18" imgW="473705" imgH="605880" progId="Visio.Drawing.11">
+                <p:oleObj spid="_x0000_s1531" name="Visio" r:id="rId18" imgW="473705" imgH="605880" progId="Visio.Drawing.11">
                   <p:embed/>
                 </p:oleObj>
               </mc:Choice>
@@ -18619,7 +18720,7 @@
           <a:graphicData uri="http://schemas.openxmlformats.org/presentationml/2006/ole">
             <mc:AlternateContent xmlns:mc="http://schemas.openxmlformats.org/markup-compatibility/2006">
               <mc:Choice xmlns:v="urn:schemas-microsoft-com:vml" Requires="v">
-                <p:oleObj spid="_x0000_s2275" name="Visio" r:id="rId3" imgW="3196429" imgH="1796256" progId="Visio.Drawing.11">
+                <p:oleObj spid="_x0000_s2284" name="Visio" r:id="rId3" imgW="3196429" imgH="1796256" progId="Visio.Drawing.11">
                   <p:embed/>
                 </p:oleObj>
               </mc:Choice>
@@ -18686,7 +18787,7 @@
           <a:graphicData uri="http://schemas.openxmlformats.org/presentationml/2006/ole">
             <mc:AlternateContent xmlns:mc="http://schemas.openxmlformats.org/markup-compatibility/2006">
               <mc:Choice xmlns:v="urn:schemas-microsoft-com:vml" Requires="v">
-                <p:oleObj spid="_x0000_s2276" name="Visio" r:id="rId5" imgW="3196429" imgH="1839240" progId="Visio.Drawing.11">
+                <p:oleObj spid="_x0000_s2285" name="Visio" r:id="rId5" imgW="3196429" imgH="1839240" progId="Visio.Drawing.11">
                   <p:embed/>
                 </p:oleObj>
               </mc:Choice>
@@ -18759,14 +18860,14 @@
                 <a:gridCol w="1143000">
                   <a:extLst>
                     <a:ext uri="{9D8B030D-6E8A-4147-A177-3AD203B41FA5}">
-                      <a16:colId xmlns:a16="http://schemas.microsoft.com/office/drawing/2014/main" val="251424920"/>
+                      <a16:colId xmlns:a16="http://schemas.microsoft.com/office/drawing/2014/main" xmlns="" val="251424920"/>
                     </a:ext>
                   </a:extLst>
                 </a:gridCol>
                 <a:gridCol w="4953000">
                   <a:extLst>
                     <a:ext uri="{9D8B030D-6E8A-4147-A177-3AD203B41FA5}">
-                      <a16:colId xmlns:a16="http://schemas.microsoft.com/office/drawing/2014/main" val="483884802"/>
+                      <a16:colId xmlns:a16="http://schemas.microsoft.com/office/drawing/2014/main" xmlns="" val="483884802"/>
                     </a:ext>
                   </a:extLst>
                 </a:gridCol>
@@ -18802,7 +18903,7 @@
                 </a:tc>
                 <a:extLst>
                   <a:ext uri="{0D108BD9-81ED-4DB2-BD59-A6C34878D82A}">
-                    <a16:rowId xmlns:a16="http://schemas.microsoft.com/office/drawing/2014/main" val="3649715620"/>
+                    <a16:rowId xmlns:a16="http://schemas.microsoft.com/office/drawing/2014/main" xmlns="" val="3649715620"/>
                   </a:ext>
                 </a:extLst>
               </a:tr>
@@ -18896,7 +18997,7 @@
                 </a:tc>
                 <a:extLst>
                   <a:ext uri="{0D108BD9-81ED-4DB2-BD59-A6C34878D82A}">
-                    <a16:rowId xmlns:a16="http://schemas.microsoft.com/office/drawing/2014/main" val="2647491716"/>
+                    <a16:rowId xmlns:a16="http://schemas.microsoft.com/office/drawing/2014/main" xmlns="" val="2647491716"/>
                   </a:ext>
                 </a:extLst>
               </a:tr>
@@ -18962,7 +19063,7 @@
                 </a:tc>
                 <a:extLst>
                   <a:ext uri="{0D108BD9-81ED-4DB2-BD59-A6C34878D82A}">
-                    <a16:rowId xmlns:a16="http://schemas.microsoft.com/office/drawing/2014/main" val="4237780404"/>
+                    <a16:rowId xmlns:a16="http://schemas.microsoft.com/office/drawing/2014/main" xmlns="" val="4237780404"/>
                   </a:ext>
                 </a:extLst>
               </a:tr>
@@ -19055,7 +19156,7 @@
           <a:graphicData uri="http://schemas.openxmlformats.org/presentationml/2006/ole">
             <mc:AlternateContent xmlns:mc="http://schemas.openxmlformats.org/markup-compatibility/2006">
               <mc:Choice xmlns:v="urn:schemas-microsoft-com:vml" Requires="v">
-                <p:oleObj spid="_x0000_s2277" name="Visio" r:id="rId7" imgW="311625" imgH="605880" progId="Visio.Drawing.11">
+                <p:oleObj spid="_x0000_s2286" name="Visio" r:id="rId7" imgW="311625" imgH="605880" progId="Visio.Drawing.11">
                   <p:embed/>
                 </p:oleObj>
               </mc:Choice>
@@ -19194,7 +19295,7 @@
           <a:graphicData uri="http://schemas.openxmlformats.org/presentationml/2006/ole">
             <mc:AlternateContent xmlns:mc="http://schemas.openxmlformats.org/markup-compatibility/2006">
               <mc:Choice xmlns:v="urn:schemas-microsoft-com:vml" Requires="v">
-                <p:oleObj spid="_x0000_s2278" name="Visio" r:id="rId9" imgW="523193" imgH="605880" progId="Visio.Drawing.11">
+                <p:oleObj spid="_x0000_s2287" name="Visio" r:id="rId9" imgW="523193" imgH="605880" progId="Visio.Drawing.11">
                   <p:embed/>
                 </p:oleObj>
               </mc:Choice>
@@ -19276,14 +19377,14 @@
                 <a:gridCol w="1249680">
                   <a:extLst>
                     <a:ext uri="{9D8B030D-6E8A-4147-A177-3AD203B41FA5}">
-                      <a16:colId xmlns:a16="http://schemas.microsoft.com/office/drawing/2014/main" val="757892436"/>
+                      <a16:colId xmlns:a16="http://schemas.microsoft.com/office/drawing/2014/main" xmlns="" val="757892436"/>
                     </a:ext>
                   </a:extLst>
                 </a:gridCol>
                 <a:gridCol w="4998720">
                   <a:extLst>
                     <a:ext uri="{9D8B030D-6E8A-4147-A177-3AD203B41FA5}">
-                      <a16:colId xmlns:a16="http://schemas.microsoft.com/office/drawing/2014/main" val="1878775400"/>
+                      <a16:colId xmlns:a16="http://schemas.microsoft.com/office/drawing/2014/main" xmlns="" val="1878775400"/>
                     </a:ext>
                   </a:extLst>
                 </a:gridCol>
@@ -19425,7 +19526,7 @@
                 </a:tc>
                 <a:extLst>
                   <a:ext uri="{0D108BD9-81ED-4DB2-BD59-A6C34878D82A}">
-                    <a16:rowId xmlns:a16="http://schemas.microsoft.com/office/drawing/2014/main" val="3923741175"/>
+                    <a16:rowId xmlns:a16="http://schemas.microsoft.com/office/drawing/2014/main" xmlns="" val="3923741175"/>
                   </a:ext>
                 </a:extLst>
               </a:tr>
@@ -19591,7 +19692,7 @@
           <a:graphicData uri="http://schemas.openxmlformats.org/presentationml/2006/ole">
             <mc:AlternateContent xmlns:mc="http://schemas.openxmlformats.org/markup-compatibility/2006">
               <mc:Choice xmlns:v="urn:schemas-microsoft-com:vml" Requires="v">
-                <p:oleObj spid="_x0000_s3287" name="Visio" r:id="rId3" imgW="2481981" imgH="2067768" progId="Visio.Drawing.11">
+                <p:oleObj spid="_x0000_s3296" name="Visio" r:id="rId3" imgW="2481981" imgH="2067768" progId="Visio.Drawing.11">
                   <p:embed/>
                 </p:oleObj>
               </mc:Choice>
@@ -19721,7 +19822,7 @@
           <a:graphicData uri="http://schemas.openxmlformats.org/presentationml/2006/ole">
             <mc:AlternateContent xmlns:mc="http://schemas.openxmlformats.org/markup-compatibility/2006">
               <mc:Choice xmlns:v="urn:schemas-microsoft-com:vml" Requires="v">
-                <p:oleObj spid="_x0000_s3288" name="Visio" r:id="rId5" imgW="2481981" imgH="2072088" progId="Visio.Drawing.11">
+                <p:oleObj spid="_x0000_s3297" name="Visio" r:id="rId5" imgW="2481981" imgH="2072088" progId="Visio.Drawing.11">
                   <p:embed/>
                 </p:oleObj>
               </mc:Choice>
@@ -19851,7 +19952,7 @@
           <a:graphicData uri="http://schemas.openxmlformats.org/presentationml/2006/ole">
             <mc:AlternateContent xmlns:mc="http://schemas.openxmlformats.org/markup-compatibility/2006">
               <mc:Choice xmlns:v="urn:schemas-microsoft-com:vml" Requires="v">
-                <p:oleObj spid="_x0000_s3289" name="Visio" r:id="rId7" imgW="2481981" imgH="2067768" progId="Visio.Drawing.11">
+                <p:oleObj spid="_x0000_s3298" name="Visio" r:id="rId7" imgW="2481981" imgH="2067768" progId="Visio.Drawing.11">
                   <p:embed/>
                 </p:oleObj>
               </mc:Choice>
@@ -19981,7 +20082,7 @@
           <a:graphicData uri="http://schemas.openxmlformats.org/presentationml/2006/ole">
             <mc:AlternateContent xmlns:mc="http://schemas.openxmlformats.org/markup-compatibility/2006">
               <mc:Choice xmlns:v="urn:schemas-microsoft-com:vml" Requires="v">
-                <p:oleObj spid="_x0000_s3290" name="Visio" r:id="rId9" imgW="2481981" imgH="2067768" progId="Visio.Drawing.11">
+                <p:oleObj spid="_x0000_s3299" name="Visio" r:id="rId9" imgW="2481981" imgH="2067768" progId="Visio.Drawing.11">
                   <p:embed/>
                 </p:oleObj>
               </mc:Choice>

</xml_diff>